<commit_message>
slajdy do rebuild, Chinook denormalizacja - zadania
</commit_message>
<xml_diff>
--- a/DEVSQL_00_Intro/DEVSQL_00A_Intro.pptx
+++ b/DEVSQL_00_Intro/DEVSQL_00A_Intro.pptx
@@ -224,7 +224,7 @@
           <a:p>
             <a:fld id="{A72FB546-F199-4B4F-99BF-57E72CB8BE0D}" type="datetimeFigureOut">
               <a:rPr lang="en-GB" smtClean="0"/>
-              <a:t>04/10/2018</a:t>
+              <a:t>05/10/2018</a:t>
             </a:fld>
             <a:endParaRPr lang="en-GB"/>
           </a:p>
@@ -716,7 +716,7 @@
           <a:p>
             <a:fld id="{B71B97B5-CD53-4045-9EAB-8675E61DEBFF}" type="datetime1">
               <a:rPr lang="en-US" smtClean="0"/>
-              <a:t>10/4/2018</a:t>
+              <a:t>10/5/2018</a:t>
             </a:fld>
             <a:endParaRPr lang="en-US" dirty="0"/>
           </a:p>
@@ -891,7 +891,7 @@
           <a:p>
             <a:fld id="{8A62E2F4-43B8-4444-AA47-B1745BCB38D5}" type="datetime1">
               <a:rPr lang="en-US" smtClean="0"/>
-              <a:t>10/4/2018</a:t>
+              <a:t>10/5/2018</a:t>
             </a:fld>
             <a:endParaRPr lang="en-US" dirty="0"/>
           </a:p>
@@ -1075,7 +1075,7 @@
           <a:p>
             <a:fld id="{E5F1EBDA-92E6-40EF-8B05-F511C7F9FEF3}" type="datetime1">
               <a:rPr lang="en-US" smtClean="0"/>
-              <a:t>10/4/2018</a:t>
+              <a:t>10/5/2018</a:t>
             </a:fld>
             <a:endParaRPr lang="en-US" dirty="0"/>
           </a:p>
@@ -1249,7 +1249,7 @@
           <a:p>
             <a:fld id="{DDF47470-A926-4F8F-B54B-9CD8FE1AE246}" type="datetime1">
               <a:rPr lang="en-US" smtClean="0"/>
-              <a:t>10/4/2018</a:t>
+              <a:t>10/5/2018</a:t>
             </a:fld>
             <a:endParaRPr lang="en-US" dirty="0"/>
           </a:p>
@@ -1511,7 +1511,7 @@
           <a:p>
             <a:fld id="{EC6453AE-6942-4706-95D7-B941FA946658}" type="datetime1">
               <a:rPr lang="en-US" smtClean="0"/>
-              <a:t>10/4/2018</a:t>
+              <a:t>10/5/2018</a:t>
             </a:fld>
             <a:endParaRPr lang="en-US" dirty="0"/>
           </a:p>
@@ -1804,7 +1804,7 @@
           <a:p>
             <a:fld id="{7485DE8E-F3D1-43D3-AA4E-AD1474DCFEA5}" type="datetime1">
               <a:rPr lang="en-US" smtClean="0"/>
-              <a:t>10/4/2018</a:t>
+              <a:t>10/5/2018</a:t>
             </a:fld>
             <a:endParaRPr lang="en-US" dirty="0"/>
           </a:p>
@@ -2250,7 +2250,7 @@
           <a:p>
             <a:fld id="{D2004977-84DE-42EE-A6BE-94658AD3A20A}" type="datetime1">
               <a:rPr lang="en-US" smtClean="0"/>
-              <a:t>10/4/2018</a:t>
+              <a:t>10/5/2018</a:t>
             </a:fld>
             <a:endParaRPr lang="en-US" dirty="0"/>
           </a:p>
@@ -2372,7 +2372,7 @@
           <a:p>
             <a:fld id="{C197578A-6273-4B7A-8481-BC3DC51245D3}" type="datetime1">
               <a:rPr lang="en-US" smtClean="0"/>
-              <a:t>10/4/2018</a:t>
+              <a:t>10/5/2018</a:t>
             </a:fld>
             <a:endParaRPr lang="en-US" dirty="0"/>
           </a:p>
@@ -2471,7 +2471,7 @@
           <a:p>
             <a:fld id="{2CE4314A-B21F-46BB-BE72-50070CD80ECC}" type="datetime1">
               <a:rPr lang="en-US" smtClean="0"/>
-              <a:t>10/4/2018</a:t>
+              <a:t>10/5/2018</a:t>
             </a:fld>
             <a:endParaRPr lang="en-US" dirty="0"/>
           </a:p>
@@ -2763,7 +2763,7 @@
           <a:p>
             <a:fld id="{BC8C3F01-2333-4625-81F9-3F061226A6CA}" type="datetime1">
               <a:rPr lang="en-US" smtClean="0"/>
-              <a:t>10/4/2018</a:t>
+              <a:t>10/5/2018</a:t>
             </a:fld>
             <a:endParaRPr lang="en-US" dirty="0"/>
           </a:p>
@@ -3041,7 +3041,7 @@
           <a:p>
             <a:fld id="{769527E7-0EFF-4D9C-9765-9427F2C57259}" type="datetime1">
               <a:rPr lang="en-US" smtClean="0"/>
-              <a:t>10/4/2018</a:t>
+              <a:t>10/5/2018</a:t>
             </a:fld>
             <a:endParaRPr lang="en-US" dirty="0"/>
           </a:p>
@@ -3343,7 +3343,7 @@
           <a:p>
             <a:fld id="{87D9E37C-E6FE-426E-AAEF-6A78AD0B3306}" type="datetime1">
               <a:rPr lang="en-US" smtClean="0"/>
-              <a:t>10/4/2018</a:t>
+              <a:t>10/5/2018</a:t>
             </a:fld>
             <a:endParaRPr lang="en-US" dirty="0"/>
           </a:p>
@@ -3973,7 +3973,7 @@
           <p:cNvPr id="7" name="Picture 2" descr="Obraz moÅ¼e zawieraÄ: 1 osoba, uÅmiecha siÄ">
             <a:extLst>
               <a:ext uri="{FF2B5EF4-FFF2-40B4-BE49-F238E27FC236}">
-                <a16:creationId xmlns:a16="http://schemas.microsoft.com/office/drawing/2014/main" xmlns="" id="{59F475D3-B464-481B-9197-2DBADE7ED80B}"/>
+                <a16:creationId xmlns="" xmlns:a16="http://schemas.microsoft.com/office/drawing/2014/main" id="{59F475D3-B464-481B-9197-2DBADE7ED80B}"/>
               </a:ext>
             </a:extLst>
           </p:cNvPr>
@@ -4024,7 +4024,7 @@
         <p:spPr>
           <a:xfrm>
             <a:off x="3869267" y="1123837"/>
-            <a:ext cx="6764867" cy="3046988"/>
+            <a:ext cx="6764867" cy="4031873"/>
           </a:xfrm>
           <a:prstGeom prst="rect">
             <a:avLst/>
@@ -4122,7 +4122,41 @@
             <a:pPr lvl="1"/>
             <a:r>
               <a:rPr lang="pl-PL" sz="1600" dirty="0" smtClean="0"/>
-              <a:t>Laboratoria: 8h</a:t>
+              <a:t>Laboratoria: </a:t>
+            </a:r>
+            <a:r>
+              <a:rPr lang="pl-PL" sz="1600" dirty="0" smtClean="0"/>
+              <a:t>8h</a:t>
+            </a:r>
+          </a:p>
+          <a:p>
+            <a:pPr lvl="1"/>
+            <a:endParaRPr lang="pl-PL" sz="1600" dirty="0"/>
+          </a:p>
+          <a:p>
+            <a:r>
+              <a:rPr lang="pl-PL" sz="1600" b="1" dirty="0" smtClean="0"/>
+              <a:t>Konsultacje</a:t>
+            </a:r>
+          </a:p>
+          <a:p>
+            <a:r>
+              <a:rPr lang="pl-PL" sz="1600" dirty="0"/>
+              <a:t>	wizytówka https://e.wsei.edu.pl</a:t>
+            </a:r>
+            <a:r>
+              <a:rPr lang="pl-PL" sz="1600" dirty="0" smtClean="0"/>
+              <a:t>/</a:t>
+            </a:r>
+          </a:p>
+          <a:p>
+            <a:r>
+              <a:rPr lang="pl-PL" sz="1600" dirty="0"/>
+              <a:t>	</a:t>
+            </a:r>
+            <a:r>
+              <a:rPr lang="pl-PL" sz="1600" dirty="0" smtClean="0"/>
+              <a:t>ustalane indywidualne po wcześniejszym uzgodnieniu (mail)</a:t>
             </a:r>
             <a:endParaRPr lang="pl-PL" sz="1600" dirty="0"/>
           </a:p>
@@ -4576,7 +4610,6 @@
               <a:rPr lang="pl-PL" sz="1600" dirty="0"/>
               <a:t>	</a:t>
             </a:r>
-            <a:endParaRPr lang="pl-PL" sz="1600" dirty="0"/>
           </a:p>
           <a:p>
             <a:endParaRPr lang="pl-PL" sz="1600" b="1" dirty="0"/>

</xml_diff>